<commit_message>
update the start page
</commit_message>
<xml_diff>
--- a/EduMate_Presentation_SV.pptx
+++ b/EduMate_Presentation_SV.pptx
@@ -310,7 +310,7 @@
           <a:p>
             <a:fld id="{5BCAD085-E8A6-8845-BD4E-CB4CCA059FC4}" type="datetimeFigureOut">
               <a:rPr lang="en-US" smtClean="0"/>
-              <a:t>10/17/2025</a:t>
+              <a:t>12/9/2025</a:t>
             </a:fld>
             <a:endParaRPr lang="en-US"/>
           </a:p>
@@ -478,7 +478,7 @@
           <a:p>
             <a:fld id="{5BCAD085-E8A6-8845-BD4E-CB4CCA059FC4}" type="datetimeFigureOut">
               <a:rPr lang="en-US" smtClean="0"/>
-              <a:t>10/17/2025</a:t>
+              <a:t>12/9/2025</a:t>
             </a:fld>
             <a:endParaRPr lang="en-US"/>
           </a:p>
@@ -656,7 +656,7 @@
           <a:p>
             <a:fld id="{5BCAD085-E8A6-8845-BD4E-CB4CCA059FC4}" type="datetimeFigureOut">
               <a:rPr lang="en-US" smtClean="0"/>
-              <a:t>10/17/2025</a:t>
+              <a:t>12/9/2025</a:t>
             </a:fld>
             <a:endParaRPr lang="en-US"/>
           </a:p>
@@ -824,7 +824,7 @@
           <a:p>
             <a:fld id="{5BCAD085-E8A6-8845-BD4E-CB4CCA059FC4}" type="datetimeFigureOut">
               <a:rPr lang="en-US" smtClean="0"/>
-              <a:t>10/17/2025</a:t>
+              <a:t>12/9/2025</a:t>
             </a:fld>
             <a:endParaRPr lang="en-US"/>
           </a:p>
@@ -1069,7 +1069,7 @@
           <a:p>
             <a:fld id="{5BCAD085-E8A6-8845-BD4E-CB4CCA059FC4}" type="datetimeFigureOut">
               <a:rPr lang="en-US" smtClean="0"/>
-              <a:t>10/17/2025</a:t>
+              <a:t>12/9/2025</a:t>
             </a:fld>
             <a:endParaRPr lang="en-US"/>
           </a:p>
@@ -1354,7 +1354,7 @@
           <a:p>
             <a:fld id="{5BCAD085-E8A6-8845-BD4E-CB4CCA059FC4}" type="datetimeFigureOut">
               <a:rPr lang="en-US" smtClean="0"/>
-              <a:t>10/17/2025</a:t>
+              <a:t>12/9/2025</a:t>
             </a:fld>
             <a:endParaRPr lang="en-US"/>
           </a:p>
@@ -1773,7 +1773,7 @@
           <a:p>
             <a:fld id="{5BCAD085-E8A6-8845-BD4E-CB4CCA059FC4}" type="datetimeFigureOut">
               <a:rPr lang="en-US" smtClean="0"/>
-              <a:t>10/17/2025</a:t>
+              <a:t>12/9/2025</a:t>
             </a:fld>
             <a:endParaRPr lang="en-US"/>
           </a:p>
@@ -1890,7 +1890,7 @@
           <a:p>
             <a:fld id="{5BCAD085-E8A6-8845-BD4E-CB4CCA059FC4}" type="datetimeFigureOut">
               <a:rPr lang="en-US" smtClean="0"/>
-              <a:t>10/17/2025</a:t>
+              <a:t>12/9/2025</a:t>
             </a:fld>
             <a:endParaRPr lang="en-US"/>
           </a:p>
@@ -1985,7 +1985,7 @@
           <a:p>
             <a:fld id="{5BCAD085-E8A6-8845-BD4E-CB4CCA059FC4}" type="datetimeFigureOut">
               <a:rPr lang="en-US" smtClean="0"/>
-              <a:t>10/17/2025</a:t>
+              <a:t>12/9/2025</a:t>
             </a:fld>
             <a:endParaRPr lang="en-US"/>
           </a:p>
@@ -2260,7 +2260,7 @@
           <a:p>
             <a:fld id="{5BCAD085-E8A6-8845-BD4E-CB4CCA059FC4}" type="datetimeFigureOut">
               <a:rPr lang="en-US" smtClean="0"/>
-              <a:t>10/17/2025</a:t>
+              <a:t>12/9/2025</a:t>
             </a:fld>
             <a:endParaRPr lang="en-US"/>
           </a:p>
@@ -2512,7 +2512,7 @@
           <a:p>
             <a:fld id="{5BCAD085-E8A6-8845-BD4E-CB4CCA059FC4}" type="datetimeFigureOut">
               <a:rPr lang="en-US" smtClean="0"/>
-              <a:t>10/17/2025</a:t>
+              <a:t>12/9/2025</a:t>
             </a:fld>
             <a:endParaRPr lang="en-US"/>
           </a:p>
@@ -2723,7 +2723,7 @@
           <a:p>
             <a:fld id="{5BCAD085-E8A6-8845-BD4E-CB4CCA059FC4}" type="datetimeFigureOut">
               <a:rPr lang="en-US" smtClean="0"/>
-              <a:t>10/17/2025</a:t>
+              <a:t>12/9/2025</a:t>
             </a:fld>
             <a:endParaRPr lang="en-US"/>
           </a:p>
@@ -3116,7 +3116,28 @@
           <a:lstStyle/>
           <a:p>
             <a:r>
-              <a:t>EduMate – AI-drivet system för bedömning och feedback</a:t>
+              <a:rPr lang="sv-SE" dirty="0" err="1"/>
+              <a:t>teach</a:t>
+            </a:r>
+            <a:r>
+              <a:rPr dirty="0"/>
+              <a:t>Mate – AI-</a:t>
+            </a:r>
+            <a:r>
+              <a:rPr dirty="0" err="1"/>
+              <a:t>drivet</a:t>
+            </a:r>
+            <a:r>
+              <a:rPr dirty="0"/>
+              <a:t> system för </a:t>
+            </a:r>
+            <a:r>
+              <a:rPr dirty="0" err="1"/>
+              <a:t>bedömning</a:t>
+            </a:r>
+            <a:r>
+              <a:rPr dirty="0"/>
+              <a:t> och feedback</a:t>
             </a:r>
           </a:p>
         </p:txBody>
@@ -3353,7 +3374,24 @@
           <a:lstStyle/>
           <a:p>
             <a:r>
-              <a:t>2️⃣ Lösningen – EduMate</a:t>
+              <a:rPr dirty="0"/>
+              <a:t>2️⃣ </a:t>
+            </a:r>
+            <a:r>
+              <a:rPr dirty="0" err="1"/>
+              <a:t>Lösningen</a:t>
+            </a:r>
+            <a:r>
+              <a:rPr dirty="0"/>
+              <a:t> – </a:t>
+            </a:r>
+            <a:r>
+              <a:rPr lang="sv-SE" dirty="0" err="1"/>
+              <a:t>teach</a:t>
+            </a:r>
+            <a:r>
+              <a:rPr dirty="0"/>
+              <a:t>Mate</a:t>
             </a:r>
           </a:p>
         </p:txBody>

</xml_diff>